<commit_message>
- Nuevos cambios presentación
</commit_message>
<xml_diff>
--- a/0.Presentación/PowerPoint/Docker-Desde Cero y para todos.pptx
+++ b/0.Presentación/PowerPoint/Docker-Desde Cero y para todos.pptx
@@ -122,6 +122,11 @@
       </a:defRPr>
     </a:lvl9pPr>
   </p:defaultTextStyle>
+  <p:extLst>
+    <p:ext uri="{EFAFB233-063F-42B5-8137-9DF3F51BA10A}">
+      <p15:sldGuideLst xmlns:p15="http://schemas.microsoft.com/office/powerpoint/2012/main"/>
+    </p:ext>
+  </p:extLst>
 </p:presentation>
 </file>
 
@@ -272,7 +277,7 @@
           <a:p>
             <a:fld id="{F3242F8D-B7FC-458D-A756-3A97F032460F}" type="datetimeFigureOut">
               <a:rPr lang="es-ES" smtClean="0"/>
-              <a:t>04/08/2022</a:t>
+              <a:t>14/09/2022</a:t>
             </a:fld>
             <a:endParaRPr lang="es-ES"/>
           </a:p>
@@ -470,7 +475,7 @@
           <a:p>
             <a:fld id="{F3242F8D-B7FC-458D-A756-3A97F032460F}" type="datetimeFigureOut">
               <a:rPr lang="es-ES" smtClean="0"/>
-              <a:t>04/08/2022</a:t>
+              <a:t>14/09/2022</a:t>
             </a:fld>
             <a:endParaRPr lang="es-ES"/>
           </a:p>
@@ -678,7 +683,7 @@
           <a:p>
             <a:fld id="{F3242F8D-B7FC-458D-A756-3A97F032460F}" type="datetimeFigureOut">
               <a:rPr lang="es-ES" smtClean="0"/>
-              <a:t>04/08/2022</a:t>
+              <a:t>14/09/2022</a:t>
             </a:fld>
             <a:endParaRPr lang="es-ES"/>
           </a:p>
@@ -876,7 +881,7 @@
           <a:p>
             <a:fld id="{F3242F8D-B7FC-458D-A756-3A97F032460F}" type="datetimeFigureOut">
               <a:rPr lang="es-ES" smtClean="0"/>
-              <a:t>04/08/2022</a:t>
+              <a:t>14/09/2022</a:t>
             </a:fld>
             <a:endParaRPr lang="es-ES"/>
           </a:p>
@@ -1151,7 +1156,7 @@
           <a:p>
             <a:fld id="{F3242F8D-B7FC-458D-A756-3A97F032460F}" type="datetimeFigureOut">
               <a:rPr lang="es-ES" smtClean="0"/>
-              <a:t>04/08/2022</a:t>
+              <a:t>14/09/2022</a:t>
             </a:fld>
             <a:endParaRPr lang="es-ES"/>
           </a:p>
@@ -1416,7 +1421,7 @@
           <a:p>
             <a:fld id="{F3242F8D-B7FC-458D-A756-3A97F032460F}" type="datetimeFigureOut">
               <a:rPr lang="es-ES" smtClean="0"/>
-              <a:t>04/08/2022</a:t>
+              <a:t>14/09/2022</a:t>
             </a:fld>
             <a:endParaRPr lang="es-ES"/>
           </a:p>
@@ -1828,7 +1833,7 @@
           <a:p>
             <a:fld id="{F3242F8D-B7FC-458D-A756-3A97F032460F}" type="datetimeFigureOut">
               <a:rPr lang="es-ES" smtClean="0"/>
-              <a:t>04/08/2022</a:t>
+              <a:t>14/09/2022</a:t>
             </a:fld>
             <a:endParaRPr lang="es-ES"/>
           </a:p>
@@ -1969,7 +1974,7 @@
           <a:p>
             <a:fld id="{F3242F8D-B7FC-458D-A756-3A97F032460F}" type="datetimeFigureOut">
               <a:rPr lang="es-ES" smtClean="0"/>
-              <a:t>04/08/2022</a:t>
+              <a:t>14/09/2022</a:t>
             </a:fld>
             <a:endParaRPr lang="es-ES"/>
           </a:p>
@@ -2082,7 +2087,7 @@
           <a:p>
             <a:fld id="{F3242F8D-B7FC-458D-A756-3A97F032460F}" type="datetimeFigureOut">
               <a:rPr lang="es-ES" smtClean="0"/>
-              <a:t>04/08/2022</a:t>
+              <a:t>14/09/2022</a:t>
             </a:fld>
             <a:endParaRPr lang="es-ES"/>
           </a:p>
@@ -2393,7 +2398,7 @@
           <a:p>
             <a:fld id="{F3242F8D-B7FC-458D-A756-3A97F032460F}" type="datetimeFigureOut">
               <a:rPr lang="es-ES" smtClean="0"/>
-              <a:t>04/08/2022</a:t>
+              <a:t>14/09/2022</a:t>
             </a:fld>
             <a:endParaRPr lang="es-ES"/>
           </a:p>
@@ -2681,7 +2686,7 @@
           <a:p>
             <a:fld id="{F3242F8D-B7FC-458D-A756-3A97F032460F}" type="datetimeFigureOut">
               <a:rPr lang="es-ES" smtClean="0"/>
-              <a:t>04/08/2022</a:t>
+              <a:t>14/09/2022</a:t>
             </a:fld>
             <a:endParaRPr lang="es-ES"/>
           </a:p>
@@ -2922,7 +2927,7 @@
           <a:p>
             <a:fld id="{F3242F8D-B7FC-458D-A756-3A97F032460F}" type="datetimeFigureOut">
               <a:rPr lang="es-ES" smtClean="0"/>
-              <a:t>04/08/2022</a:t>
+              <a:t>14/09/2022</a:t>
             </a:fld>
             <a:endParaRPr lang="es-ES"/>
           </a:p>
@@ -4478,7 +4483,7 @@
         <p:spPr>
           <a:xfrm>
             <a:off x="838200" y="1510183"/>
-            <a:ext cx="10283483" cy="4524315"/>
+            <a:ext cx="10283483" cy="4247317"/>
           </a:xfrm>
           <a:prstGeom prst="rect">
             <a:avLst/>
@@ -4497,7 +4502,15 @@
             </a:pPr>
             <a:r>
               <a:rPr lang="es-ES" dirty="0"/>
-              <a:t>Por defecto ya hemos indicado que un contenedor está aislado de todo. Hemos visto como podemos conectar el contenedor a un puerto de red para poder acceder a él. Eso incluye al sistema de archivos que contiene. Detal manera que si se elimina el contenedor, se eliminan también sus archivos. </a:t>
+              <a:t>Por defecto ya hemos indicado que un contenedor está aislado de todo</a:t>
+            </a:r>
+            <a:r>
+              <a:rPr lang="es-ES"/>
+              <a:t>. De </a:t>
+            </a:r>
+            <a:r>
+              <a:rPr lang="es-ES" dirty="0"/>
+              <a:t>tal manera que si se elimina el contenedor, se eliminan también sus archivos. </a:t>
             </a:r>
           </a:p>
           <a:p>

</xml_diff>